<commit_message>
change made for test purposes
see title
</commit_message>
<xml_diff>
--- a/Editable Diagrams/4.3_ServicePlugability.pptx
+++ b/Editable Diagrams/4.3_ServicePlugability.pptx
@@ -104,6 +104,22 @@
       </a:defRPr>
     </a:lvl9pPr>
   </p:defaultTextStyle>
+  <p:extLst>
+    <p:ext uri="{EFAFB233-063F-42B5-8137-9DF3F51BA10A}">
+      <p15:sldGuideLst xmlns:p15="http://schemas.microsoft.com/office/powerpoint/2012/main">
+        <p15:guide id="1" orient="horz" pos="2160">
+          <p15:clr>
+            <a:srgbClr val="A4A3A4"/>
+          </p15:clr>
+        </p15:guide>
+        <p15:guide id="2" pos="2880">
+          <p15:clr>
+            <a:srgbClr val="A4A3A4"/>
+          </p15:clr>
+        </p15:guide>
+      </p15:sldGuideLst>
+    </p:ext>
+  </p:extLst>
 </p:presentation>
 </file>
 
@@ -289,7 +305,7 @@
             <a:fld id="{1D8BD707-D9CF-40AE-B4C6-C98DA3205C09}" type="datetimeFigureOut">
               <a:rPr lang="en-US" smtClean="0"/>
               <a:pPr/>
-              <a:t>10/13/2014</a:t>
+              <a:t>12/8/2014</a:t>
             </a:fld>
             <a:endParaRPr lang="en-US"/>
           </a:p>
@@ -456,7 +472,7 @@
             <a:fld id="{1D8BD707-D9CF-40AE-B4C6-C98DA3205C09}" type="datetimeFigureOut">
               <a:rPr lang="en-US" smtClean="0"/>
               <a:pPr/>
-              <a:t>10/13/2014</a:t>
+              <a:t>12/8/2014</a:t>
             </a:fld>
             <a:endParaRPr lang="en-US"/>
           </a:p>
@@ -633,7 +649,7 @@
             <a:fld id="{1D8BD707-D9CF-40AE-B4C6-C98DA3205C09}" type="datetimeFigureOut">
               <a:rPr lang="en-US" smtClean="0"/>
               <a:pPr/>
-              <a:t>10/13/2014</a:t>
+              <a:t>12/8/2014</a:t>
             </a:fld>
             <a:endParaRPr lang="en-US"/>
           </a:p>
@@ -800,7 +816,7 @@
             <a:fld id="{1D8BD707-D9CF-40AE-B4C6-C98DA3205C09}" type="datetimeFigureOut">
               <a:rPr lang="en-US" smtClean="0"/>
               <a:pPr/>
-              <a:t>10/13/2014</a:t>
+              <a:t>12/8/2014</a:t>
             </a:fld>
             <a:endParaRPr lang="en-US"/>
           </a:p>
@@ -1043,7 +1059,7 @@
             <a:fld id="{1D8BD707-D9CF-40AE-B4C6-C98DA3205C09}" type="datetimeFigureOut">
               <a:rPr lang="en-US" smtClean="0"/>
               <a:pPr/>
-              <a:t>10/13/2014</a:t>
+              <a:t>12/8/2014</a:t>
             </a:fld>
             <a:endParaRPr lang="en-US"/>
           </a:p>
@@ -1328,7 +1344,7 @@
             <a:fld id="{1D8BD707-D9CF-40AE-B4C6-C98DA3205C09}" type="datetimeFigureOut">
               <a:rPr lang="en-US" smtClean="0"/>
               <a:pPr/>
-              <a:t>10/13/2014</a:t>
+              <a:t>12/8/2014</a:t>
             </a:fld>
             <a:endParaRPr lang="en-US"/>
           </a:p>
@@ -1747,7 +1763,7 @@
             <a:fld id="{1D8BD707-D9CF-40AE-B4C6-C98DA3205C09}" type="datetimeFigureOut">
               <a:rPr lang="en-US" smtClean="0"/>
               <a:pPr/>
-              <a:t>10/13/2014</a:t>
+              <a:t>12/8/2014</a:t>
             </a:fld>
             <a:endParaRPr lang="en-US"/>
           </a:p>
@@ -1862,7 +1878,7 @@
             <a:fld id="{1D8BD707-D9CF-40AE-B4C6-C98DA3205C09}" type="datetimeFigureOut">
               <a:rPr lang="en-US" smtClean="0"/>
               <a:pPr/>
-              <a:t>10/13/2014</a:t>
+              <a:t>12/8/2014</a:t>
             </a:fld>
             <a:endParaRPr lang="en-US"/>
           </a:p>
@@ -1954,7 +1970,7 @@
             <a:fld id="{1D8BD707-D9CF-40AE-B4C6-C98DA3205C09}" type="datetimeFigureOut">
               <a:rPr lang="en-US" smtClean="0"/>
               <a:pPr/>
-              <a:t>10/13/2014</a:t>
+              <a:t>12/8/2014</a:t>
             </a:fld>
             <a:endParaRPr lang="en-US"/>
           </a:p>
@@ -2228,7 +2244,7 @@
             <a:fld id="{1D8BD707-D9CF-40AE-B4C6-C98DA3205C09}" type="datetimeFigureOut">
               <a:rPr lang="en-US" smtClean="0"/>
               <a:pPr/>
-              <a:t>10/13/2014</a:t>
+              <a:t>12/8/2014</a:t>
             </a:fld>
             <a:endParaRPr lang="en-US"/>
           </a:p>
@@ -2478,7 +2494,7 @@
             <a:fld id="{1D8BD707-D9CF-40AE-B4C6-C98DA3205C09}" type="datetimeFigureOut">
               <a:rPr lang="en-US" smtClean="0"/>
               <a:pPr/>
-              <a:t>10/13/2014</a:t>
+              <a:t>12/8/2014</a:t>
             </a:fld>
             <a:endParaRPr lang="en-US"/>
           </a:p>
@@ -2688,7 +2704,7 @@
             <a:fld id="{1D8BD707-D9CF-40AE-B4C6-C98DA3205C09}" type="datetimeFigureOut">
               <a:rPr lang="en-US" smtClean="0"/>
               <a:pPr/>
-              <a:t>10/13/2014</a:t>
+              <a:t>12/8/2014</a:t>
             </a:fld>
             <a:endParaRPr lang="en-US"/>
           </a:p>
@@ -3852,10 +3868,10 @@
         </p:nvGrpSpPr>
         <p:grpSpPr>
           <a:xfrm>
-            <a:off x="5211120" y="2406446"/>
-            <a:ext cx="108001" cy="1290323"/>
-            <a:chOff x="5211120" y="2622140"/>
-            <a:chExt cx="108001" cy="1290323"/>
+            <a:off x="5211120" y="2294063"/>
+            <a:ext cx="439163" cy="1402706"/>
+            <a:chOff x="5211120" y="2509757"/>
+            <a:chExt cx="439163" cy="1402706"/>
           </a:xfrm>
         </p:grpSpPr>
         <p:cxnSp>
@@ -3869,9 +3885,9 @@
             <p:nvPr/>
           </p:nvCxnSpPr>
           <p:spPr bwMode="auto">
-            <a:xfrm flipH="1" flipV="1">
-              <a:off x="5263224" y="2622140"/>
-              <a:ext cx="1897" cy="240916"/>
+            <a:xfrm flipV="1">
+              <a:off x="5265121" y="2509757"/>
+              <a:ext cx="385162" cy="353299"/>
             </a:xfrm>
             <a:prstGeom prst="straightConnector1">
               <a:avLst/>
@@ -3970,9 +3986,9 @@
           <p:nvPr/>
         </p:nvCxnSpPr>
         <p:spPr bwMode="auto">
-          <a:xfrm flipH="1" flipV="1">
-            <a:off x="4053446" y="2401915"/>
-            <a:ext cx="2011" cy="245447"/>
+          <a:xfrm flipV="1">
+            <a:off x="4055457" y="2289532"/>
+            <a:ext cx="385048" cy="357830"/>
           </a:xfrm>
           <a:prstGeom prst="straightConnector1">
             <a:avLst/>
@@ -5278,7 +5294,7 @@
         </p:nvGrpSpPr>
         <p:grpSpPr>
           <a:xfrm>
-            <a:off x="3489845" y="203363"/>
+            <a:off x="3876904" y="90980"/>
             <a:ext cx="2340311" cy="2299659"/>
             <a:chOff x="3489845" y="203363"/>
             <a:chExt cx="2340311" cy="2299659"/>
@@ -5823,11 +5839,7 @@
               </a:pPr>
               <a:r>
                 <a:rPr lang="en-US" sz="1200" dirty="0" smtClean="0"/>
-                <a:t>Service </a:t>
-              </a:r>
-              <a:r>
-                <a:rPr lang="en-US" sz="1200" dirty="0" smtClean="0"/>
-                <a:t>Factory</a:t>
+                <a:t>Service Factory</a:t>
               </a:r>
               <a:endParaRPr lang="en-US" sz="1200" dirty="0"/>
             </a:p>

</xml_diff>